<commit_message>
make parentUID approach consistent for components and massBreakdown; add table for possible combinations (#733)
</commit_message>
<xml_diff>
--- a/documentation/parentUID_transformations.pptx
+++ b/documentation/parentUID_transformations.pptx
@@ -6307,15 +6307,15 @@
         </p:nvSpPr>
         <p:spPr>
           <a:xfrm>
-            <a:off x="8511286" y="2200703"/>
-            <a:ext cx="535724" cy="159462"/>
+            <a:off x="8270415" y="2182657"/>
+            <a:ext cx="426967" cy="159462"/>
           </a:xfrm>
           <a:prstGeom prst="rect">
             <a:avLst/>
           </a:prstGeom>
           <a:solidFill>
-            <a:schemeClr val="accent5">
-              <a:lumMod val="75000"/>
+            <a:schemeClr val="bg1">
+              <a:lumMod val="65000"/>
             </a:schemeClr>
           </a:solidFill>
           <a:effectLst>
@@ -6327,24 +6327,27 @@
           </a:effectLst>
         </p:spPr>
         <p:txBody>
-          <a:bodyPr wrap="none" tIns="18000" bIns="18000" rtlCol="0">
+          <a:bodyPr wrap="none" lIns="36000" tIns="18000" rIns="36000" bIns="18000" rtlCol="0">
             <a:spAutoFit/>
           </a:bodyPr>
-          <a:lstStyle/>
-          <a:p>
-            <a:r>
-              <a:rPr lang="de-DE" sz="800" dirty="0" err="1">
+          <a:lstStyle>
+            <a:defPPr>
+              <a:defRPr lang="en-US"/>
+            </a:defPPr>
+            <a:lvl1pPr>
+              <a:defRPr sz="800" i="1">
                 <a:solidFill>
                   <a:schemeClr val="bg1"/>
                 </a:solidFill>
-              </a:rPr>
+              </a:defRPr>
+            </a:lvl1pPr>
+          </a:lstStyle>
+          <a:p>
+            <a:r>
+              <a:rPr lang="de-DE" dirty="0" err="1"/>
               <a:t>fuselage</a:t>
             </a:r>
-            <a:endParaRPr lang="en-US" sz="800" dirty="0">
-              <a:solidFill>
-                <a:schemeClr val="bg1"/>
-              </a:solidFill>
-            </a:endParaRPr>
+            <a:endParaRPr lang="en-US" dirty="0"/>
           </a:p>
         </p:txBody>
       </p:sp>
@@ -6362,7 +6365,7 @@
         </p:nvSpPr>
         <p:spPr>
           <a:xfrm>
-            <a:off x="9292124" y="2720911"/>
+            <a:off x="9008386" y="2702865"/>
             <a:ext cx="340405" cy="159462"/>
           </a:xfrm>
           <a:prstGeom prst="rect">
@@ -6417,7 +6420,7 @@
         </p:nvSpPr>
         <p:spPr>
           <a:xfrm>
-            <a:off x="9292124" y="2981015"/>
+            <a:off x="9008386" y="2962969"/>
             <a:ext cx="864587" cy="159462"/>
           </a:xfrm>
           <a:prstGeom prst="rect">
@@ -6504,7 +6507,7 @@
         </p:nvSpPr>
         <p:spPr>
           <a:xfrm>
-            <a:off x="9292124" y="3241119"/>
+            <a:off x="9008386" y="3223073"/>
             <a:ext cx="854969" cy="159462"/>
           </a:xfrm>
           <a:prstGeom prst="rect">
@@ -6591,7 +6594,7 @@
         </p:nvSpPr>
         <p:spPr>
           <a:xfrm>
-            <a:off x="9307270" y="3761325"/>
+            <a:off x="9023532" y="3743279"/>
             <a:ext cx="885426" cy="159462"/>
           </a:xfrm>
           <a:prstGeom prst="rect">
@@ -6658,8 +6661,8 @@
         </p:nvCxnSpPr>
         <p:spPr>
           <a:xfrm rot="16200000" flipH="1">
-            <a:off x="8764369" y="2374944"/>
-            <a:ext cx="180373" cy="150814"/>
+            <a:off x="8474875" y="2351142"/>
+            <a:ext cx="180373" cy="162325"/>
           </a:xfrm>
           <a:prstGeom prst="bentConnector2">
             <a:avLst/>
@@ -6698,7 +6701,7 @@
         </p:nvCxnSpPr>
         <p:spPr>
           <a:xfrm rot="16200000" flipH="1">
-            <a:off x="9147235" y="2655752"/>
+            <a:off x="8863497" y="2637706"/>
             <a:ext cx="180373" cy="109405"/>
           </a:xfrm>
           <a:prstGeom prst="bentConnector2">
@@ -6738,7 +6741,7 @@
         </p:nvCxnSpPr>
         <p:spPr>
           <a:xfrm rot="16200000" flipH="1">
-            <a:off x="9017183" y="2785804"/>
+            <a:off x="8733445" y="2767758"/>
             <a:ext cx="440477" cy="109405"/>
           </a:xfrm>
           <a:prstGeom prst="bentConnector2">
@@ -6778,7 +6781,7 @@
         </p:nvCxnSpPr>
         <p:spPr>
           <a:xfrm rot="16200000" flipH="1">
-            <a:off x="8887131" y="2915856"/>
+            <a:off x="8603393" y="2897810"/>
             <a:ext cx="700581" cy="109405"/>
           </a:xfrm>
           <a:prstGeom prst="bentConnector2">
@@ -6818,8 +6821,8 @@
         </p:nvCxnSpPr>
         <p:spPr>
           <a:xfrm rot="16200000" flipH="1">
-            <a:off x="8244161" y="2895152"/>
-            <a:ext cx="1220789" cy="150814"/>
+            <a:off x="7954667" y="2871350"/>
+            <a:ext cx="1220789" cy="162325"/>
           </a:xfrm>
           <a:prstGeom prst="bentConnector2">
             <a:avLst/>
@@ -6857,7 +6860,7 @@
         </p:nvCxnSpPr>
         <p:spPr>
           <a:xfrm rot="16200000" flipH="1">
-            <a:off x="9121429" y="3655215"/>
+            <a:off x="8837691" y="3637169"/>
             <a:ext cx="247130" cy="124552"/>
           </a:xfrm>
           <a:prstGeom prst="bentConnector2">
@@ -6935,45 +6938,6 @@
           </a:p>
         </p:txBody>
       </p:sp>
-      <p:cxnSp>
-        <p:nvCxnSpPr>
-          <p:cNvPr id="60" name="Verbinder: gewinkelt 59">
-            <a:extLst>
-              <a:ext uri="{FF2B5EF4-FFF2-40B4-BE49-F238E27FC236}">
-                <a16:creationId xmlns:a16="http://schemas.microsoft.com/office/drawing/2014/main" id="{37260F4B-7E91-42B3-B271-F4DF84F1A4BA}"/>
-              </a:ext>
-            </a:extLst>
-          </p:cNvPr>
-          <p:cNvCxnSpPr>
-            <a:cxnSpLocks/>
-            <a:endCxn id="3" idx="1"/>
-          </p:cNvCxnSpPr>
-          <p:nvPr/>
-        </p:nvCxnSpPr>
-        <p:spPr>
-          <a:xfrm rot="16200000" flipH="1">
-            <a:off x="8307899" y="2077047"/>
-            <a:ext cx="225618" cy="181156"/>
-          </a:xfrm>
-          <a:prstGeom prst="bentConnector2">
-            <a:avLst/>
-          </a:prstGeom>
-        </p:spPr>
-        <p:style>
-          <a:lnRef idx="1">
-            <a:schemeClr val="dk1"/>
-          </a:lnRef>
-          <a:fillRef idx="0">
-            <a:schemeClr val="dk1"/>
-          </a:fillRef>
-          <a:effectRef idx="0">
-            <a:schemeClr val="dk1"/>
-          </a:effectRef>
-          <a:fontRef idx="minor">
-            <a:schemeClr val="tx1"/>
-          </a:fontRef>
-        </p:style>
-      </p:cxnSp>
       <p:sp>
         <p:nvSpPr>
           <p:cNvPr id="59" name="Textfeld 58">
@@ -6988,8 +6952,8 @@
         </p:nvSpPr>
         <p:spPr>
           <a:xfrm>
-            <a:off x="8117334" y="1953857"/>
-            <a:ext cx="1242648" cy="159462"/>
+            <a:off x="9262295" y="1916987"/>
+            <a:ext cx="1129083" cy="128685"/>
           </a:xfrm>
           <a:prstGeom prst="rect">
             <a:avLst/>
@@ -6999,30 +6963,24 @@
               <a:lumMod val="65000"/>
             </a:schemeClr>
           </a:solidFill>
-          <a:effectLst>
-            <a:outerShdw blurRad="50800" dist="38100" dir="2700000" algn="tl" rotWithShape="0">
-              <a:prstClr val="black">
-                <a:alpha val="40000"/>
-              </a:prstClr>
-            </a:outerShdw>
-          </a:effectLst>
+          <a:effectLst/>
         </p:spPr>
         <p:txBody>
-          <a:bodyPr wrap="square" lIns="36000" tIns="18000" rIns="36000" bIns="18000" rtlCol="0">
+          <a:bodyPr wrap="none" lIns="36000" tIns="18000" rIns="36000" bIns="18000" rtlCol="0">
             <a:spAutoFit/>
           </a:bodyPr>
           <a:lstStyle/>
           <a:p>
             <a:r>
-              <a:rPr lang="de-DE" sz="800" i="1" dirty="0">
+              <a:rPr lang="de-DE" sz="600" i="1" dirty="0">
                 <a:solidFill>
                   <a:schemeClr val="bg1"/>
                 </a:solidFill>
               </a:rPr>
-              <a:t>CPACS</a:t>
-            </a:r>
-            <a:r>
-              <a:rPr lang="de-DE" sz="800" dirty="0">
+              <a:t>global (CPACS)</a:t>
+            </a:r>
+            <a:r>
+              <a:rPr lang="de-DE" sz="600" dirty="0">
                 <a:solidFill>
                   <a:schemeClr val="bg1"/>
                 </a:solidFill>
@@ -7030,7 +6988,7 @@
               <a:t> </a:t>
             </a:r>
             <a:r>
-              <a:rPr lang="de-DE" sz="800" dirty="0" err="1">
+              <a:rPr lang="de-DE" sz="600" dirty="0" err="1">
                 <a:solidFill>
                   <a:schemeClr val="bg1"/>
                 </a:solidFill>
@@ -7038,7 +6996,7 @@
               <a:t>coordinate</a:t>
             </a:r>
             <a:r>
-              <a:rPr lang="de-DE" sz="800" dirty="0">
+              <a:rPr lang="de-DE" sz="600" dirty="0">
                 <a:solidFill>
                   <a:schemeClr val="bg1"/>
                 </a:solidFill>
@@ -7046,14 +7004,14 @@
               <a:t> </a:t>
             </a:r>
             <a:r>
-              <a:rPr lang="de-DE" sz="800" dirty="0" err="1">
+              <a:rPr lang="de-DE" sz="600" dirty="0" err="1">
                 <a:solidFill>
                   <a:schemeClr val="bg1"/>
                 </a:solidFill>
               </a:rPr>
               <a:t>system</a:t>
             </a:r>
-            <a:endParaRPr lang="en-US" sz="800" dirty="0">
+            <a:endParaRPr lang="en-US" sz="600" dirty="0">
               <a:solidFill>
                 <a:schemeClr val="bg1"/>
               </a:solidFill>
@@ -7075,7 +7033,7 @@
         </p:nvSpPr>
         <p:spPr>
           <a:xfrm>
-            <a:off x="8929962" y="2460807"/>
+            <a:off x="8646224" y="2442761"/>
             <a:ext cx="505514" cy="159462"/>
           </a:xfrm>
           <a:prstGeom prst="rect">
@@ -7146,7 +7104,7 @@
         </p:nvSpPr>
         <p:spPr>
           <a:xfrm>
-            <a:off x="8929962" y="3501223"/>
+            <a:off x="8646224" y="3483177"/>
             <a:ext cx="768406" cy="159462"/>
           </a:xfrm>
           <a:prstGeom prst="rect">
@@ -7196,6 +7154,87 @@
               <a:t>tailplane</a:t>
             </a:r>
             <a:endParaRPr lang="en-US" sz="800" dirty="0">
+              <a:solidFill>
+                <a:schemeClr val="bg1"/>
+              </a:solidFill>
+            </a:endParaRPr>
+          </a:p>
+        </p:txBody>
+      </p:sp>
+      <p:sp>
+        <p:nvSpPr>
+          <p:cNvPr id="33" name="Textfeld 32">
+            <a:extLst>
+              <a:ext uri="{FF2B5EF4-FFF2-40B4-BE49-F238E27FC236}">
+                <a16:creationId xmlns:a16="http://schemas.microsoft.com/office/drawing/2014/main" id="{7269DAC9-6F6F-41E6-94F8-C9E83EAEE82A}"/>
+              </a:ext>
+            </a:extLst>
+          </p:cNvPr>
+          <p:cNvSpPr txBox="1"/>
+          <p:nvPr/>
+        </p:nvSpPr>
+        <p:spPr>
+          <a:xfrm>
+            <a:off x="9262295" y="2132594"/>
+            <a:ext cx="923651" cy="128685"/>
+          </a:xfrm>
+          <a:prstGeom prst="rect">
+            <a:avLst/>
+          </a:prstGeom>
+          <a:solidFill>
+            <a:schemeClr val="accent5">
+              <a:lumMod val="75000"/>
+            </a:schemeClr>
+          </a:solidFill>
+          <a:effectLst/>
+        </p:spPr>
+        <p:txBody>
+          <a:bodyPr wrap="none" tIns="18000" bIns="18000" rtlCol="0">
+            <a:spAutoFit/>
+          </a:bodyPr>
+          <a:lstStyle/>
+          <a:p>
+            <a:r>
+              <a:rPr lang="de-DE" sz="600" dirty="0" err="1">
+                <a:solidFill>
+                  <a:schemeClr val="bg1"/>
+                </a:solidFill>
+              </a:rPr>
+              <a:t>local</a:t>
+            </a:r>
+            <a:r>
+              <a:rPr lang="de-DE" sz="600" dirty="0">
+                <a:solidFill>
+                  <a:schemeClr val="bg1"/>
+                </a:solidFill>
+              </a:rPr>
+              <a:t> </a:t>
+            </a:r>
+            <a:r>
+              <a:rPr lang="de-DE" sz="600" dirty="0" err="1">
+                <a:solidFill>
+                  <a:schemeClr val="bg1"/>
+                </a:solidFill>
+              </a:rPr>
+              <a:t>coordinate</a:t>
+            </a:r>
+            <a:r>
+              <a:rPr lang="de-DE" sz="600" dirty="0">
+                <a:solidFill>
+                  <a:schemeClr val="bg1"/>
+                </a:solidFill>
+              </a:rPr>
+              <a:t> </a:t>
+            </a:r>
+            <a:r>
+              <a:rPr lang="de-DE" sz="600" dirty="0" err="1">
+                <a:solidFill>
+                  <a:schemeClr val="bg1"/>
+                </a:solidFill>
+              </a:rPr>
+              <a:t>system</a:t>
+            </a:r>
+            <a:endParaRPr lang="en-US" sz="600" dirty="0">
               <a:solidFill>
                 <a:schemeClr val="bg1"/>
               </a:solidFill>

</xml_diff>

<commit_message>
adjust parentUID figure (#733)
</commit_message>
<xml_diff>
--- a/documentation/parentUID_transformations.pptx
+++ b/documentation/parentUID_transformations.pptx
@@ -261,7 +261,7 @@
           <a:p>
             <a:fld id="{4BA96097-E4F7-4049-AA93-EF26FCCEF44B}" type="datetimeFigureOut">
               <a:rPr lang="en-US" smtClean="0"/>
-              <a:t>10/31/2021</a:t>
+              <a:t>11/1/2021</a:t>
             </a:fld>
             <a:endParaRPr lang="en-US"/>
           </a:p>
@@ -461,7 +461,7 @@
           <a:p>
             <a:fld id="{4BA96097-E4F7-4049-AA93-EF26FCCEF44B}" type="datetimeFigureOut">
               <a:rPr lang="en-US" smtClean="0"/>
-              <a:t>10/31/2021</a:t>
+              <a:t>11/1/2021</a:t>
             </a:fld>
             <a:endParaRPr lang="en-US"/>
           </a:p>
@@ -671,7 +671,7 @@
           <a:p>
             <a:fld id="{4BA96097-E4F7-4049-AA93-EF26FCCEF44B}" type="datetimeFigureOut">
               <a:rPr lang="en-US" smtClean="0"/>
-              <a:t>10/31/2021</a:t>
+              <a:t>11/1/2021</a:t>
             </a:fld>
             <a:endParaRPr lang="en-US"/>
           </a:p>
@@ -871,7 +871,7 @@
           <a:p>
             <a:fld id="{4BA96097-E4F7-4049-AA93-EF26FCCEF44B}" type="datetimeFigureOut">
               <a:rPr lang="en-US" smtClean="0"/>
-              <a:t>10/31/2021</a:t>
+              <a:t>11/1/2021</a:t>
             </a:fld>
             <a:endParaRPr lang="en-US"/>
           </a:p>
@@ -1147,7 +1147,7 @@
           <a:p>
             <a:fld id="{4BA96097-E4F7-4049-AA93-EF26FCCEF44B}" type="datetimeFigureOut">
               <a:rPr lang="en-US" smtClean="0"/>
-              <a:t>10/31/2021</a:t>
+              <a:t>11/1/2021</a:t>
             </a:fld>
             <a:endParaRPr lang="en-US"/>
           </a:p>
@@ -1415,7 +1415,7 @@
           <a:p>
             <a:fld id="{4BA96097-E4F7-4049-AA93-EF26FCCEF44B}" type="datetimeFigureOut">
               <a:rPr lang="en-US" smtClean="0"/>
-              <a:t>10/31/2021</a:t>
+              <a:t>11/1/2021</a:t>
             </a:fld>
             <a:endParaRPr lang="en-US"/>
           </a:p>
@@ -1830,7 +1830,7 @@
           <a:p>
             <a:fld id="{4BA96097-E4F7-4049-AA93-EF26FCCEF44B}" type="datetimeFigureOut">
               <a:rPr lang="en-US" smtClean="0"/>
-              <a:t>10/31/2021</a:t>
+              <a:t>11/1/2021</a:t>
             </a:fld>
             <a:endParaRPr lang="en-US"/>
           </a:p>
@@ -1972,7 +1972,7 @@
           <a:p>
             <a:fld id="{4BA96097-E4F7-4049-AA93-EF26FCCEF44B}" type="datetimeFigureOut">
               <a:rPr lang="en-US" smtClean="0"/>
-              <a:t>10/31/2021</a:t>
+              <a:t>11/1/2021</a:t>
             </a:fld>
             <a:endParaRPr lang="en-US"/>
           </a:p>
@@ -2085,7 +2085,7 @@
           <a:p>
             <a:fld id="{4BA96097-E4F7-4049-AA93-EF26FCCEF44B}" type="datetimeFigureOut">
               <a:rPr lang="en-US" smtClean="0"/>
-              <a:t>10/31/2021</a:t>
+              <a:t>11/1/2021</a:t>
             </a:fld>
             <a:endParaRPr lang="en-US"/>
           </a:p>
@@ -2398,7 +2398,7 @@
           <a:p>
             <a:fld id="{4BA96097-E4F7-4049-AA93-EF26FCCEF44B}" type="datetimeFigureOut">
               <a:rPr lang="en-US" smtClean="0"/>
-              <a:t>10/31/2021</a:t>
+              <a:t>11/1/2021</a:t>
             </a:fld>
             <a:endParaRPr lang="en-US"/>
           </a:p>
@@ -2687,7 +2687,7 @@
           <a:p>
             <a:fld id="{4BA96097-E4F7-4049-AA93-EF26FCCEF44B}" type="datetimeFigureOut">
               <a:rPr lang="en-US" smtClean="0"/>
-              <a:t>10/31/2021</a:t>
+              <a:t>11/1/2021</a:t>
             </a:fld>
             <a:endParaRPr lang="en-US"/>
           </a:p>
@@ -2930,7 +2930,7 @@
           <a:p>
             <a:fld id="{4BA96097-E4F7-4049-AA93-EF26FCCEF44B}" type="datetimeFigureOut">
               <a:rPr lang="en-US" smtClean="0"/>
-              <a:t>10/31/2021</a:t>
+              <a:t>11/1/2021</a:t>
             </a:fld>
             <a:endParaRPr lang="en-US"/>
           </a:p>
@@ -5831,8 +5831,8 @@
         </p:nvCxnSpPr>
         <p:spPr>
           <a:xfrm>
-            <a:off x="2894953" y="2033588"/>
-            <a:ext cx="301875" cy="312770"/>
+            <a:off x="2914650" y="2132594"/>
+            <a:ext cx="282178" cy="213764"/>
           </a:xfrm>
           <a:prstGeom prst="straightConnector1">
             <a:avLst/>

</xml_diff>